<commit_message>
remove hashtags from tags
</commit_message>
<xml_diff>
--- a/content/post/nyrconf/plot.pptx
+++ b/content/post/nyrconf/plot.pptx
@@ -2271,7 +2271,7 @@
           </p:nvSpPr>
           <p:spPr>
             <a:xfrm>
-              <a:off x="4210643" y="2484588"/>
+              <a:off x="3871413" y="4098107"/>
               <a:ext cx="68579" cy="68579"/>
             </a:xfrm>
             <a:prstGeom prst="ellipse">
@@ -2297,7 +2297,7 @@
           </p:nvSpPr>
           <p:spPr>
             <a:xfrm>
-              <a:off x="2383214" y="3804297"/>
+              <a:off x="3860812" y="3156602"/>
               <a:ext cx="68579" cy="68579"/>
             </a:xfrm>
             <a:prstGeom prst="ellipse">
@@ -2323,7 +2323,7 @@
           </p:nvSpPr>
           <p:spPr>
             <a:xfrm>
-              <a:off x="2644752" y="2677022"/>
+              <a:off x="3934899" y="3947052"/>
               <a:ext cx="68579" cy="68579"/>
             </a:xfrm>
             <a:prstGeom prst="ellipse">
@@ -2349,7 +2349,7 @@
           </p:nvSpPr>
           <p:spPr>
             <a:xfrm>
-              <a:off x="3242663" y="3435750"/>
+              <a:off x="2489899" y="3811814"/>
               <a:ext cx="68579" cy="68579"/>
             </a:xfrm>
             <a:prstGeom prst="ellipse">
@@ -2375,7 +2375,7 @@
           </p:nvSpPr>
           <p:spPr>
             <a:xfrm>
-              <a:off x="3032832" y="3659852"/>
+              <a:off x="4161240" y="4217669"/>
               <a:ext cx="68579" cy="68579"/>
             </a:xfrm>
             <a:prstGeom prst="ellipse">
@@ -2401,7 +2401,7 @@
           </p:nvSpPr>
           <p:spPr>
             <a:xfrm>
-              <a:off x="4401038" y="3314806"/>
+              <a:off x="2546143" y="3263862"/>
               <a:ext cx="68579" cy="68579"/>
             </a:xfrm>
             <a:prstGeom prst="ellipse">
@@ -2427,7 +2427,7 @@
           </p:nvSpPr>
           <p:spPr>
             <a:xfrm>
-              <a:off x="2704519" y="3922145"/>
+              <a:off x="4067721" y="2856683"/>
               <a:ext cx="68579" cy="68579"/>
             </a:xfrm>
             <a:prstGeom prst="ellipse">
@@ -2453,7 +2453,7 @@
           </p:nvSpPr>
           <p:spPr>
             <a:xfrm>
-              <a:off x="3875762" y="2815244"/>
+              <a:off x="2649556" y="3658756"/>
               <a:ext cx="68579" cy="68579"/>
             </a:xfrm>
             <a:prstGeom prst="ellipse">
@@ -2479,7 +2479,7 @@
           </p:nvSpPr>
           <p:spPr>
             <a:xfrm>
-              <a:off x="3681172" y="4085665"/>
+              <a:off x="3655561" y="3371712"/>
               <a:ext cx="68579" cy="68579"/>
             </a:xfrm>
             <a:prstGeom prst="ellipse">
@@ -2505,7 +2505,7 @@
           </p:nvSpPr>
           <p:spPr>
             <a:xfrm>
-              <a:off x="3915515" y="3298199"/>
+              <a:off x="1960192" y="2771678"/>
               <a:ext cx="68579" cy="68579"/>
             </a:xfrm>
             <a:prstGeom prst="ellipse">
@@ -2531,7 +2531,7 @@
           </p:nvSpPr>
           <p:spPr>
             <a:xfrm>
-              <a:off x="2870980" y="3516170"/>
+              <a:off x="4062883" y="3026635"/>
               <a:ext cx="68579" cy="68579"/>
             </a:xfrm>
             <a:prstGeom prst="ellipse">
@@ -2557,7 +2557,7 @@
           </p:nvSpPr>
           <p:spPr>
             <a:xfrm>
-              <a:off x="2864341" y="4190789"/>
+              <a:off x="4294509" y="3608213"/>
               <a:ext cx="68579" cy="68579"/>
             </a:xfrm>
             <a:prstGeom prst="ellipse">
@@ -2583,7 +2583,7 @@
           </p:nvSpPr>
           <p:spPr>
             <a:xfrm>
-              <a:off x="1618482" y="2690925"/>
+              <a:off x="2988395" y="3508809"/>
               <a:ext cx="68579" cy="68579"/>
             </a:xfrm>
             <a:prstGeom prst="ellipse">
@@ -2609,7 +2609,7 @@
           </p:nvSpPr>
           <p:spPr>
             <a:xfrm>
-              <a:off x="2633818" y="3515461"/>
+              <a:off x="3665976" y="3208090"/>
               <a:ext cx="68579" cy="68579"/>
             </a:xfrm>
             <a:prstGeom prst="ellipse">
@@ -2635,7 +2635,7 @@
           </p:nvSpPr>
           <p:spPr>
             <a:xfrm>
-              <a:off x="4449351" y="3918635"/>
+              <a:off x="3083504" y="3191188"/>
               <a:ext cx="68579" cy="68579"/>
             </a:xfrm>
             <a:prstGeom prst="ellipse">
@@ -2661,7 +2661,7 @@
           </p:nvSpPr>
           <p:spPr>
             <a:xfrm>
-              <a:off x="5364056" y="3483557"/>
+              <a:off x="3073513" y="3058200"/>
               <a:ext cx="68579" cy="68579"/>
             </a:xfrm>
             <a:prstGeom prst="ellipse">
@@ -2687,7 +2687,7 @@
           </p:nvSpPr>
           <p:spPr>
             <a:xfrm>
-              <a:off x="2800102" y="3715704"/>
+              <a:off x="4484586" y="3264184"/>
               <a:ext cx="68579" cy="68579"/>
             </a:xfrm>
             <a:prstGeom prst="ellipse">
@@ -2713,7 +2713,7 @@
           </p:nvSpPr>
           <p:spPr>
             <a:xfrm>
-              <a:off x="2191095" y="3330617"/>
+              <a:off x="2801387" y="3513492"/>
               <a:ext cx="68579" cy="68579"/>
             </a:xfrm>
             <a:prstGeom prst="ellipse">
@@ -2739,7 +2739,7 @@
           </p:nvSpPr>
           <p:spPr>
             <a:xfrm>
-              <a:off x="3447726" y="3614302"/>
+              <a:off x="2887836" y="2718494"/>
               <a:ext cx="68579" cy="68579"/>
             </a:xfrm>
             <a:prstGeom prst="ellipse">
@@ -2765,7 +2765,7 @@
           </p:nvSpPr>
           <p:spPr>
             <a:xfrm>
-              <a:off x="2547884" y="3486569"/>
+              <a:off x="1333923" y="2623539"/>
               <a:ext cx="68579" cy="68579"/>
             </a:xfrm>
             <a:prstGeom prst="ellipse">
@@ -2791,7 +2791,7 @@
           </p:nvSpPr>
           <p:spPr>
             <a:xfrm>
-              <a:off x="3897163" y="3591343"/>
+              <a:off x="3780023" y="3396836"/>
               <a:ext cx="68579" cy="68579"/>
             </a:xfrm>
             <a:prstGeom prst="ellipse">
@@ -2817,7 +2817,7 @@
           </p:nvSpPr>
           <p:spPr>
             <a:xfrm>
-              <a:off x="3836748" y="3206531"/>
+              <a:off x="2877347" y="2721428"/>
               <a:ext cx="68579" cy="68579"/>
             </a:xfrm>
             <a:prstGeom prst="ellipse">
@@ -2843,7 +2843,7 @@
           </p:nvSpPr>
           <p:spPr>
             <a:xfrm>
-              <a:off x="3504908" y="3145383"/>
+              <a:off x="2676498" y="3117855"/>
               <a:ext cx="68579" cy="68579"/>
             </a:xfrm>
             <a:prstGeom prst="ellipse">
@@ -2869,7 +2869,7 @@
           </p:nvSpPr>
           <p:spPr>
             <a:xfrm>
-              <a:off x="3928382" y="2587176"/>
+              <a:off x="3659689" y="3361973"/>
               <a:ext cx="68579" cy="68579"/>
             </a:xfrm>
             <a:prstGeom prst="ellipse">
@@ -2895,7 +2895,7 @@
           </p:nvSpPr>
           <p:spPr>
             <a:xfrm>
-              <a:off x="3085475" y="3279546"/>
+              <a:off x="3092138" y="2876503"/>
               <a:ext cx="68579" cy="68579"/>
             </a:xfrm>
             <a:prstGeom prst="ellipse">
@@ -2921,7 +2921,7 @@
           </p:nvSpPr>
           <p:spPr>
             <a:xfrm>
-              <a:off x="3652933" y="3574925"/>
+              <a:off x="3436322" y="3187101"/>
               <a:ext cx="68579" cy="68579"/>
             </a:xfrm>
             <a:prstGeom prst="ellipse">
@@ -2947,7 +2947,7 @@
           </p:nvSpPr>
           <p:spPr>
             <a:xfrm>
-              <a:off x="3576169" y="3310050"/>
+              <a:off x="2858740" y="3105001"/>
               <a:ext cx="68579" cy="68579"/>
             </a:xfrm>
             <a:prstGeom prst="ellipse">
@@ -2973,7 +2973,7 @@
           </p:nvSpPr>
           <p:spPr>
             <a:xfrm>
-              <a:off x="3811698" y="3053530"/>
+              <a:off x="5343633" y="3429431"/>
               <a:ext cx="68579" cy="68579"/>
             </a:xfrm>
             <a:prstGeom prst="ellipse">
@@ -2999,7 +2999,7 @@
           </p:nvSpPr>
           <p:spPr>
             <a:xfrm>
-              <a:off x="5168997" y="3955163"/>
+              <a:off x="2331258" y="3487930"/>
               <a:ext cx="68579" cy="68579"/>
             </a:xfrm>
             <a:prstGeom prst="ellipse">
@@ -3025,7 +3025,7 @@
           </p:nvSpPr>
           <p:spPr>
             <a:xfrm>
-              <a:off x="2720674" y="3864081"/>
+              <a:off x="2487228" y="3148665"/>
               <a:ext cx="68579" cy="68579"/>
             </a:xfrm>
             <a:prstGeom prst="ellipse">
@@ -3051,7 +3051,7 @@
           </p:nvSpPr>
           <p:spPr>
             <a:xfrm>
-              <a:off x="1605606" y="3635528"/>
+              <a:off x="2549012" y="3338293"/>
               <a:ext cx="68579" cy="68579"/>
             </a:xfrm>
             <a:prstGeom prst="ellipse">
@@ -3077,7 +3077,7 @@
           </p:nvSpPr>
           <p:spPr>
             <a:xfrm>
-              <a:off x="3008027" y="4049214"/>
+              <a:off x="1436943" y="2867826"/>
               <a:ext cx="68579" cy="68579"/>
             </a:xfrm>
             <a:prstGeom prst="ellipse">
@@ -3103,7 +3103,7 @@
           </p:nvSpPr>
           <p:spPr>
             <a:xfrm>
-              <a:off x="3394710" y="3320812"/>
+              <a:off x="2201685" y="2898777"/>
               <a:ext cx="68579" cy="68579"/>
             </a:xfrm>
             <a:prstGeom prst="ellipse">
@@ -3129,7 +3129,7 @@
           </p:nvSpPr>
           <p:spPr>
             <a:xfrm>
-              <a:off x="3955149" y="3815411"/>
+              <a:off x="2175972" y="3670234"/>
               <a:ext cx="68579" cy="68579"/>
             </a:xfrm>
             <a:prstGeom prst="ellipse">
@@ -3155,7 +3155,7 @@
           </p:nvSpPr>
           <p:spPr>
             <a:xfrm>
-              <a:off x="3458223" y="3639710"/>
+              <a:off x="2646018" y="4133930"/>
               <a:ext cx="68579" cy="68579"/>
             </a:xfrm>
             <a:prstGeom prst="ellipse">
@@ -3181,7 +3181,7 @@
           </p:nvSpPr>
           <p:spPr>
             <a:xfrm>
-              <a:off x="3851146" y="3175119"/>
+              <a:off x="3276544" y="2388869"/>
               <a:ext cx="68579" cy="68579"/>
             </a:xfrm>
             <a:prstGeom prst="ellipse">
@@ -3207,7 +3207,7 @@
           </p:nvSpPr>
           <p:spPr>
             <a:xfrm>
-              <a:off x="4818938" y="3485004"/>
+              <a:off x="3203570" y="3403478"/>
               <a:ext cx="68579" cy="68579"/>
             </a:xfrm>
             <a:prstGeom prst="ellipse">
@@ -3233,7 +3233,7 @@
           </p:nvSpPr>
           <p:spPr>
             <a:xfrm>
-              <a:off x="4074614" y="3442786"/>
+              <a:off x="3099983" y="3643310"/>
               <a:ext cx="68579" cy="68579"/>
             </a:xfrm>
             <a:prstGeom prst="ellipse">
@@ -3259,7 +3259,7 @@
           </p:nvSpPr>
           <p:spPr>
             <a:xfrm>
-              <a:off x="3078168" y="4108377"/>
+              <a:off x="2875311" y="3010963"/>
               <a:ext cx="68579" cy="68579"/>
             </a:xfrm>
             <a:prstGeom prst="ellipse">
@@ -3285,7 +3285,7 @@
           </p:nvSpPr>
           <p:spPr>
             <a:xfrm>
-              <a:off x="4841862" y="3347833"/>
+              <a:off x="2164646" y="3124103"/>
               <a:ext cx="68579" cy="68579"/>
             </a:xfrm>
             <a:prstGeom prst="ellipse">
@@ -3311,7 +3311,7 @@
           </p:nvSpPr>
           <p:spPr>
             <a:xfrm>
-              <a:off x="2527351" y="3538340"/>
+              <a:off x="4007815" y="2838415"/>
               <a:ext cx="68579" cy="68579"/>
             </a:xfrm>
             <a:prstGeom prst="ellipse">
@@ -3337,7 +3337,7 @@
           </p:nvSpPr>
           <p:spPr>
             <a:xfrm>
-              <a:off x="3357008" y="2459437"/>
+              <a:off x="4672132" y="3715663"/>
               <a:ext cx="68579" cy="68579"/>
             </a:xfrm>
             <a:prstGeom prst="ellipse">
@@ -3363,7 +3363,7 @@
           </p:nvSpPr>
           <p:spPr>
             <a:xfrm>
-              <a:off x="4438677" y="3955632"/>
+              <a:off x="2883128" y="3668996"/>
               <a:ext cx="68579" cy="68579"/>
             </a:xfrm>
             <a:prstGeom prst="ellipse">
@@ -3389,7 +3389,7 @@
           </p:nvSpPr>
           <p:spPr>
             <a:xfrm>
-              <a:off x="5057887" y="3533517"/>
+              <a:off x="3825936" y="3317478"/>
               <a:ext cx="68579" cy="68579"/>
             </a:xfrm>
             <a:prstGeom prst="ellipse">
@@ -3415,7 +3415,7 @@
           </p:nvSpPr>
           <p:spPr>
             <a:xfrm>
-              <a:off x="5281572" y="3912307"/>
+              <a:off x="2138066" y="3054145"/>
               <a:ext cx="68579" cy="68579"/>
             </a:xfrm>
             <a:prstGeom prst="ellipse">
@@ -3441,7 +3441,7 @@
           </p:nvSpPr>
           <p:spPr>
             <a:xfrm>
-              <a:off x="3671180" y="2662511"/>
+              <a:off x="3796501" y="2898609"/>
               <a:ext cx="68579" cy="68579"/>
             </a:xfrm>
             <a:prstGeom prst="ellipse">
@@ -3467,7 +3467,7 @@
           </p:nvSpPr>
           <p:spPr>
             <a:xfrm>
-              <a:off x="3417822" y="3489865"/>
+              <a:off x="3732367" y="2842270"/>
               <a:ext cx="68579" cy="68579"/>
             </a:xfrm>
             <a:prstGeom prst="ellipse">
@@ -3493,7 +3493,7 @@
           </p:nvSpPr>
           <p:spPr>
             <a:xfrm>
-              <a:off x="3267227" y="3425787"/>
+              <a:off x="2243200" y="3269683"/>
               <a:ext cx="68579" cy="68579"/>
             </a:xfrm>
             <a:prstGeom prst="ellipse">
@@ -3519,7 +3519,7 @@
           </p:nvSpPr>
           <p:spPr>
             <a:xfrm>
-              <a:off x="3542568" y="3632686"/>
+              <a:off x="2552659" y="2547189"/>
               <a:ext cx="68579" cy="68579"/>
             </a:xfrm>
             <a:prstGeom prst="ellipse">
@@ -3545,7 +3545,7 @@
           </p:nvSpPr>
           <p:spPr>
             <a:xfrm>
-              <a:off x="4230278" y="3003316"/>
+              <a:off x="3946496" y="2923603"/>
               <a:ext cx="68579" cy="68579"/>
             </a:xfrm>
             <a:prstGeom prst="ellipse">
@@ -3571,7 +3571,7 @@
           </p:nvSpPr>
           <p:spPr>
             <a:xfrm>
-              <a:off x="3897045" y="3141799"/>
+              <a:off x="2438926" y="3503501"/>
               <a:ext cx="68579" cy="68579"/>
             </a:xfrm>
             <a:prstGeom prst="ellipse">
@@ -3597,7 +3597,7 @@
           </p:nvSpPr>
           <p:spPr>
             <a:xfrm>
-              <a:off x="3405244" y="3640617"/>
+              <a:off x="4221282" y="3260859"/>
               <a:ext cx="68579" cy="68579"/>
             </a:xfrm>
             <a:prstGeom prst="ellipse">
@@ -3623,7 +3623,7 @@
           </p:nvSpPr>
           <p:spPr>
             <a:xfrm>
-              <a:off x="3495673" y="3679243"/>
+              <a:off x="2460740" y="3467702"/>
               <a:ext cx="68579" cy="68579"/>
             </a:xfrm>
             <a:prstGeom prst="ellipse">
@@ -3649,7 +3649,7 @@
           </p:nvSpPr>
           <p:spPr>
             <a:xfrm>
-              <a:off x="3901172" y="3666457"/>
+              <a:off x="1445449" y="3243570"/>
               <a:ext cx="68579" cy="68579"/>
             </a:xfrm>
             <a:prstGeom prst="ellipse">
@@ -3675,7 +3675,7 @@
           </p:nvSpPr>
           <p:spPr>
             <a:xfrm>
-              <a:off x="3187692" y="3423151"/>
+              <a:off x="2191439" y="3220339"/>
               <a:ext cx="68579" cy="68579"/>
             </a:xfrm>
             <a:prstGeom prst="ellipse">
@@ -3701,7 +3701,7 @@
           </p:nvSpPr>
           <p:spPr>
             <a:xfrm>
-              <a:off x="4582236" y="3578826"/>
+              <a:off x="2672663" y="3324889"/>
               <a:ext cx="68579" cy="68579"/>
             </a:xfrm>
             <a:prstGeom prst="ellipse">
@@ -3727,7 +3727,7 @@
           </p:nvSpPr>
           <p:spPr>
             <a:xfrm>
-              <a:off x="4035268" y="3652933"/>
+              <a:off x="3617511" y="3540960"/>
               <a:ext cx="68579" cy="68579"/>
             </a:xfrm>
             <a:prstGeom prst="ellipse">
@@ -3753,7 +3753,7 @@
           </p:nvSpPr>
           <p:spPr>
             <a:xfrm>
-              <a:off x="3743246" y="3757484"/>
+              <a:off x="1927843" y="2707051"/>
               <a:ext cx="68579" cy="68579"/>
             </a:xfrm>
             <a:prstGeom prst="ellipse">
@@ -3779,7 +3779,7 @@
           </p:nvSpPr>
           <p:spPr>
             <a:xfrm>
-              <a:off x="2622847" y="3304122"/>
+              <a:off x="3956725" y="3117597"/>
               <a:ext cx="68579" cy="68579"/>
             </a:xfrm>
             <a:prstGeom prst="ellipse">
@@ -3805,7 +3805,7 @@
           </p:nvSpPr>
           <p:spPr>
             <a:xfrm>
-              <a:off x="2613911" y="3863032"/>
+              <a:off x="2659397" y="3540705"/>
               <a:ext cx="68579" cy="68579"/>
             </a:xfrm>
             <a:prstGeom prst="ellipse">
@@ -3831,7 +3831,7 @@
           </p:nvSpPr>
           <p:spPr>
             <a:xfrm>
-              <a:off x="3659108" y="3876342"/>
+              <a:off x="5051048" y="2919074"/>
               <a:ext cx="68579" cy="68579"/>
             </a:xfrm>
             <a:prstGeom prst="ellipse">
@@ -3857,7 +3857,7 @@
           </p:nvSpPr>
           <p:spPr>
             <a:xfrm>
-              <a:off x="3534816" y="3539714"/>
+              <a:off x="2255270" y="3445120"/>
               <a:ext cx="68579" cy="68579"/>
             </a:xfrm>
             <a:prstGeom prst="ellipse">
@@ -3883,7 +3883,7 @@
           </p:nvSpPr>
           <p:spPr>
             <a:xfrm>
-              <a:off x="3492849" y="3784250"/>
+              <a:off x="3194311" y="3492916"/>
               <a:ext cx="68579" cy="68579"/>
             </a:xfrm>
             <a:prstGeom prst="ellipse">
@@ -3909,7 +3909,7 @@
           </p:nvSpPr>
           <p:spPr>
             <a:xfrm>
-              <a:off x="3328123" y="3490901"/>
+              <a:off x="3744877" y="3021337"/>
               <a:ext cx="68579" cy="68579"/>
             </a:xfrm>
             <a:prstGeom prst="ellipse">
@@ -3935,7 +3935,7 @@
           </p:nvSpPr>
           <p:spPr>
             <a:xfrm>
-              <a:off x="3111422" y="3444866"/>
+              <a:off x="2973093" y="3856839"/>
               <a:ext cx="68579" cy="68579"/>
             </a:xfrm>
             <a:prstGeom prst="ellipse">
@@ -3961,7 +3961,7 @@
           </p:nvSpPr>
           <p:spPr>
             <a:xfrm>
-              <a:off x="3620386" y="3472865"/>
+              <a:off x="3228875" y="3501187"/>
               <a:ext cx="68579" cy="68579"/>
             </a:xfrm>
             <a:prstGeom prst="ellipse">
@@ -3987,7 +3987,7 @@
           </p:nvSpPr>
           <p:spPr>
             <a:xfrm>
-              <a:off x="2474831" y="3074100"/>
+              <a:off x="3227885" y="3077426"/>
               <a:ext cx="68579" cy="68579"/>
             </a:xfrm>
             <a:prstGeom prst="ellipse">
@@ -4013,7 +4013,7 @@
           </p:nvSpPr>
           <p:spPr>
             <a:xfrm>
-              <a:off x="2775806" y="3907203"/>
+              <a:off x="3587599" y="2780170"/>
               <a:ext cx="68579" cy="68579"/>
             </a:xfrm>
             <a:prstGeom prst="ellipse">
@@ -4039,7 +4039,7 @@
           </p:nvSpPr>
           <p:spPr>
             <a:xfrm>
-              <a:off x="3191931" y="3485788"/>
+              <a:off x="3545568" y="4001878"/>
               <a:ext cx="68579" cy="68579"/>
             </a:xfrm>
             <a:prstGeom prst="ellipse">
@@ -4065,7 +4065,7 @@
           </p:nvSpPr>
           <p:spPr>
             <a:xfrm>
-              <a:off x="2388753" y="2582120"/>
+              <a:off x="5364056" y="3580289"/>
               <a:ext cx="68579" cy="68579"/>
             </a:xfrm>
             <a:prstGeom prst="ellipse">
@@ -4091,7 +4091,7 @@
           </p:nvSpPr>
           <p:spPr>
             <a:xfrm>
-              <a:off x="3557259" y="3258800"/>
+              <a:off x="2506465" y="3174804"/>
               <a:ext cx="68579" cy="68579"/>
             </a:xfrm>
             <a:prstGeom prst="ellipse">
@@ -4117,7 +4117,7 @@
           </p:nvSpPr>
           <p:spPr>
             <a:xfrm>
-              <a:off x="3239566" y="4212759"/>
+              <a:off x="3234078" y="3601063"/>
               <a:ext cx="68579" cy="68579"/>
             </a:xfrm>
             <a:prstGeom prst="ellipse">
@@ -4143,7 +4143,7 @@
           </p:nvSpPr>
           <p:spPr>
             <a:xfrm>
-              <a:off x="2251046" y="3475772"/>
+              <a:off x="3761952" y="3547270"/>
               <a:ext cx="68579" cy="68579"/>
             </a:xfrm>
             <a:prstGeom prst="ellipse">
@@ -4169,7 +4169,7 @@
           </p:nvSpPr>
           <p:spPr>
             <a:xfrm>
-              <a:off x="1355653" y="4217669"/>
+              <a:off x="4000787" y="3093504"/>
               <a:ext cx="68579" cy="68579"/>
             </a:xfrm>
             <a:prstGeom prst="ellipse">
@@ -4195,7 +4195,7 @@
           </p:nvSpPr>
           <p:spPr>
             <a:xfrm>
-              <a:off x="1333923" y="3734510"/>
+              <a:off x="3990926" y="3439624"/>
               <a:ext cx="68579" cy="68579"/>
             </a:xfrm>
             <a:prstGeom prst="ellipse">
@@ -4221,7 +4221,7 @@
           </p:nvSpPr>
           <p:spPr>
             <a:xfrm>
-              <a:off x="2839818" y="2716602"/>
+              <a:off x="2079936" y="2968509"/>
               <a:ext cx="68579" cy="68579"/>
             </a:xfrm>
             <a:prstGeom prst="ellipse">
@@ -4247,7 +4247,7 @@
           </p:nvSpPr>
           <p:spPr>
             <a:xfrm>
-              <a:off x="4323665" y="3452496"/>
+              <a:off x="2745320" y="4035602"/>
               <a:ext cx="68579" cy="68579"/>
             </a:xfrm>
             <a:prstGeom prst="ellipse">
@@ -4273,7 +4273,7 @@
           </p:nvSpPr>
           <p:spPr>
             <a:xfrm>
-              <a:off x="3638071" y="3650804"/>
+              <a:off x="2193432" y="3212912"/>
               <a:ext cx="68579" cy="68579"/>
             </a:xfrm>
             <a:prstGeom prst="ellipse">
@@ -4299,7 +4299,7 @@
           </p:nvSpPr>
           <p:spPr>
             <a:xfrm>
-              <a:off x="2146355" y="3226112"/>
+              <a:off x="2558674" y="3068312"/>
               <a:ext cx="68579" cy="68579"/>
             </a:xfrm>
             <a:prstGeom prst="ellipse">
@@ -4325,7 +4325,7 @@
           </p:nvSpPr>
           <p:spPr>
             <a:xfrm>
-              <a:off x="2710849" y="3117334"/>
+              <a:off x="3172972" y="3528178"/>
               <a:ext cx="68579" cy="68579"/>
             </a:xfrm>
             <a:prstGeom prst="ellipse">
@@ -4351,7 +4351,7 @@
           </p:nvSpPr>
           <p:spPr>
             <a:xfrm>
-              <a:off x="2027591" y="2757476"/>
+              <a:off x="2278486" y="3476898"/>
               <a:ext cx="68579" cy="68579"/>
             </a:xfrm>
             <a:prstGeom prst="ellipse">
@@ -4377,7 +4377,7 @@
           </p:nvSpPr>
           <p:spPr>
             <a:xfrm>
-              <a:off x="4136202" y="3265944"/>
+              <a:off x="3900658" y="3083897"/>
               <a:ext cx="68579" cy="68579"/>
             </a:xfrm>
             <a:prstGeom prst="ellipse">
@@ -4403,7 +4403,7 @@
           </p:nvSpPr>
           <p:spPr>
             <a:xfrm>
-              <a:off x="5192529" y="3267717"/>
+              <a:off x="3344960" y="2993643"/>
               <a:ext cx="68579" cy="68579"/>
             </a:xfrm>
             <a:prstGeom prst="ellipse">
@@ -4429,7 +4429,7 @@
           </p:nvSpPr>
           <p:spPr>
             <a:xfrm>
-              <a:off x="3071960" y="3764410"/>
+              <a:off x="3687392" y="3564479"/>
               <a:ext cx="68579" cy="68579"/>
             </a:xfrm>
             <a:prstGeom prst="ellipse">
@@ -4455,7 +4455,7 @@
           </p:nvSpPr>
           <p:spPr>
             <a:xfrm>
-              <a:off x="4038718" y="3548128"/>
+              <a:off x="3979635" y="3114053"/>
               <a:ext cx="68579" cy="68579"/>
             </a:xfrm>
             <a:prstGeom prst="ellipse">
@@ -4481,7 +4481,7 @@
           </p:nvSpPr>
           <p:spPr>
             <a:xfrm>
-              <a:off x="3771782" y="3007978"/>
+              <a:off x="2330373" y="3315213"/>
               <a:ext cx="68579" cy="68579"/>
             </a:xfrm>
             <a:prstGeom prst="ellipse">
@@ -4507,7 +4507,7 @@
           </p:nvSpPr>
           <p:spPr>
             <a:xfrm>
-              <a:off x="2684042" y="2388869"/>
+              <a:off x="2395896" y="3184330"/>
               <a:ext cx="68579" cy="68579"/>
             </a:xfrm>
             <a:prstGeom prst="ellipse">
@@ -4533,7 +4533,7 @@
           </p:nvSpPr>
           <p:spPr>
             <a:xfrm>
-              <a:off x="3978714" y="3716192"/>
+              <a:off x="4700265" y="3305537"/>
               <a:ext cx="68579" cy="68579"/>
             </a:xfrm>
             <a:prstGeom prst="ellipse">
@@ -4559,7 +4559,7 @@
           </p:nvSpPr>
           <p:spPr>
             <a:xfrm>
-              <a:off x="3277758" y="2951404"/>
+              <a:off x="2016742" y="2651484"/>
               <a:ext cx="68579" cy="68579"/>
             </a:xfrm>
             <a:prstGeom prst="ellipse">
@@ -4585,7 +4585,7 @@
           </p:nvSpPr>
           <p:spPr>
             <a:xfrm>
-              <a:off x="4946696" y="3466022"/>
+              <a:off x="2769664" y="3486054"/>
               <a:ext cx="68579" cy="68579"/>
             </a:xfrm>
             <a:prstGeom prst="ellipse">
@@ -4611,7 +4611,7 @@
           </p:nvSpPr>
           <p:spPr>
             <a:xfrm>
-              <a:off x="4425905" y="3904311"/>
+              <a:off x="4825251" y="2930207"/>
               <a:ext cx="68579" cy="68579"/>
             </a:xfrm>
             <a:prstGeom prst="ellipse">
@@ -4637,7 +4637,7 @@
           </p:nvSpPr>
           <p:spPr>
             <a:xfrm>
-              <a:off x="3267690" y="3576347"/>
+              <a:off x="2265214" y="3467555"/>
               <a:ext cx="68579" cy="68579"/>
             </a:xfrm>
             <a:prstGeom prst="ellipse">
@@ -4663,7 +4663,7 @@
           </p:nvSpPr>
           <p:spPr>
             <a:xfrm>
-              <a:off x="4504031" y="3351421"/>
+              <a:off x="2793411" y="3251512"/>
               <a:ext cx="68579" cy="68579"/>
             </a:xfrm>
             <a:prstGeom prst="ellipse">
@@ -4689,7 +4689,7 @@
           </p:nvSpPr>
           <p:spPr>
             <a:xfrm>
-              <a:off x="2682213" y="3217992"/>
+              <a:off x="2648544" y="3387373"/>
               <a:ext cx="68579" cy="68579"/>
             </a:xfrm>
             <a:prstGeom prst="ellipse">
@@ -4715,7 +4715,7 @@
           </p:nvSpPr>
           <p:spPr>
             <a:xfrm>
-              <a:off x="4696821" y="3401874"/>
+              <a:off x="3783736" y="3199638"/>
               <a:ext cx="68579" cy="68579"/>
             </a:xfrm>
             <a:prstGeom prst="ellipse">
@@ -4741,7 +4741,7 @@
           </p:nvSpPr>
           <p:spPr>
             <a:xfrm>
-              <a:off x="1755773" y="3272627"/>
+              <a:off x="2451100" y="3388634"/>
               <a:ext cx="68579" cy="68579"/>
             </a:xfrm>
             <a:prstGeom prst="ellipse">
@@ -4767,7 +4767,7 @@
           </p:nvSpPr>
           <p:spPr>
             <a:xfrm>
-              <a:off x="1355538" y="3863338"/>
+              <a:off x="2536210" y="3832798"/>
               <a:ext cx="68579" cy="68579"/>
             </a:xfrm>
             <a:prstGeom prst="ellipse">
@@ -4793,7 +4793,7 @@
           </p:nvSpPr>
           <p:spPr>
             <a:xfrm>
-              <a:off x="3272286" y="3249969"/>
+              <a:off x="2761649" y="3296948"/>
               <a:ext cx="68579" cy="68579"/>
             </a:xfrm>
             <a:prstGeom prst="ellipse">
@@ -4819,7 +4819,7 @@
           </p:nvSpPr>
           <p:spPr>
             <a:xfrm>
-              <a:off x="2584250" y="3336469"/>
+              <a:off x="2573481" y="2742726"/>
               <a:ext cx="68579" cy="68579"/>
             </a:xfrm>
             <a:prstGeom prst="ellipse">
@@ -4845,7 +4845,7 @@
           </p:nvSpPr>
           <p:spPr>
             <a:xfrm>
-              <a:off x="3612506" y="3118808"/>
+              <a:off x="2132467" y="3270197"/>
               <a:ext cx="68579" cy="68579"/>
             </a:xfrm>
             <a:prstGeom prst="ellipse">
@@ -4871,18 +4871,18 @@
           </p:nvSpPr>
           <p:spPr>
             <a:xfrm>
-              <a:off x="1635737" y="4325112"/>
-              <a:ext cx="3647581" cy="0"/>
+              <a:off x="1537611" y="4325112"/>
+              <a:ext cx="3372306" cy="0"/>
             </a:xfrm>
             <a:custGeom>
               <a:avLst/>
               <a:pathLst>
-                <a:path w="3647581" h="0">
+                <a:path w="3372306" h="0">
                   <a:moveTo>
                     <a:pt x="0" y="0"/>
                   </a:moveTo>
                   <a:lnTo>
-                    <a:pt x="3647581" y="0"/>
+                    <a:pt x="3372306" y="0"/>
                   </a:lnTo>
                 </a:path>
               </a:pathLst>
@@ -4911,7 +4911,7 @@
           </p:nvSpPr>
           <p:spPr>
             <a:xfrm>
-              <a:off x="1635737" y="4325112"/>
+              <a:off x="1537611" y="4325112"/>
               <a:ext cx="0" cy="91439"/>
             </a:xfrm>
             <a:custGeom>
@@ -4951,7 +4951,7 @@
           </p:nvSpPr>
           <p:spPr>
             <a:xfrm>
-              <a:off x="2547633" y="4325112"/>
+              <a:off x="2380687" y="4325112"/>
               <a:ext cx="0" cy="91439"/>
             </a:xfrm>
             <a:custGeom>
@@ -4991,7 +4991,7 @@
           </p:nvSpPr>
           <p:spPr>
             <a:xfrm>
-              <a:off x="3459528" y="4325112"/>
+              <a:off x="3223764" y="4325112"/>
               <a:ext cx="0" cy="91439"/>
             </a:xfrm>
             <a:custGeom>
@@ -5031,7 +5031,7 @@
           </p:nvSpPr>
           <p:spPr>
             <a:xfrm>
-              <a:off x="4371423" y="4325112"/>
+              <a:off x="4066840" y="4325112"/>
               <a:ext cx="0" cy="91439"/>
             </a:xfrm>
             <a:custGeom>
@@ -5071,7 +5071,7 @@
           </p:nvSpPr>
           <p:spPr>
             <a:xfrm>
-              <a:off x="5283318" y="4325112"/>
+              <a:off x="4909917" y="4325112"/>
               <a:ext cx="0" cy="91439"/>
             </a:xfrm>
             <a:custGeom>
@@ -5111,7 +5111,7 @@
           </p:nvSpPr>
           <p:spPr>
             <a:xfrm>
-              <a:off x="1593358" y="4542972"/>
+              <a:off x="1495232" y="4542972"/>
               <a:ext cx="84757" cy="111323"/>
             </a:xfrm>
             <a:prstGeom prst="rect">
@@ -5157,7 +5157,7 @@
           </p:nvSpPr>
           <p:spPr>
             <a:xfrm>
-              <a:off x="2505254" y="4542972"/>
+              <a:off x="2338308" y="4542972"/>
               <a:ext cx="84757" cy="111323"/>
             </a:xfrm>
             <a:prstGeom prst="rect">
@@ -5203,7 +5203,7 @@
           </p:nvSpPr>
           <p:spPr>
             <a:xfrm>
-              <a:off x="3374770" y="4542972"/>
+              <a:off x="3139006" y="4542972"/>
               <a:ext cx="169515" cy="111323"/>
             </a:xfrm>
             <a:prstGeom prst="rect">
@@ -5249,7 +5249,7 @@
           </p:nvSpPr>
           <p:spPr>
             <a:xfrm>
-              <a:off x="4286666" y="4544758"/>
+              <a:off x="3982083" y="4544758"/>
               <a:ext cx="169515" cy="109537"/>
             </a:xfrm>
             <a:prstGeom prst="rect">
@@ -5295,7 +5295,7 @@
           </p:nvSpPr>
           <p:spPr>
             <a:xfrm>
-              <a:off x="5198561" y="4544758"/>
+              <a:off x="4825159" y="4544758"/>
               <a:ext cx="169515" cy="109537"/>
             </a:xfrm>
             <a:prstGeom prst="rect">
@@ -5341,15 +5341,15 @@
           </p:nvSpPr>
           <p:spPr>
             <a:xfrm>
-              <a:off x="1207008" y="2626768"/>
-              <a:ext cx="0" cy="1697839"/>
+              <a:off x="1207008" y="2602684"/>
+              <a:ext cx="0" cy="1513787"/>
             </a:xfrm>
             <a:custGeom>
               <a:avLst/>
               <a:pathLst>
-                <a:path w="0" h="1697839">
+                <a:path w="0" h="1513787">
                   <a:moveTo>
-                    <a:pt x="0" y="1697839"/>
+                    <a:pt x="0" y="1513787"/>
                   </a:moveTo>
                   <a:lnTo>
                     <a:pt x="0" y="0"/>
@@ -5381,7 +5381,7 @@
           </p:nvSpPr>
           <p:spPr>
             <a:xfrm>
-              <a:off x="1115568" y="4324607"/>
+              <a:off x="1115568" y="4116471"/>
               <a:ext cx="91439" cy="0"/>
             </a:xfrm>
             <a:custGeom>
@@ -5421,7 +5421,7 @@
           </p:nvSpPr>
           <p:spPr>
             <a:xfrm>
-              <a:off x="1115568" y="3900147"/>
+              <a:off x="1115568" y="3738025"/>
               <a:ext cx="91439" cy="0"/>
             </a:xfrm>
             <a:custGeom>
@@ -5461,7 +5461,7 @@
           </p:nvSpPr>
           <p:spPr>
             <a:xfrm>
-              <a:off x="1115568" y="3475688"/>
+              <a:off x="1115568" y="3359578"/>
               <a:ext cx="91439" cy="0"/>
             </a:xfrm>
             <a:custGeom>
@@ -5501,7 +5501,7 @@
           </p:nvSpPr>
           <p:spPr>
             <a:xfrm>
-              <a:off x="1115568" y="3051228"/>
+              <a:off x="1115568" y="2981131"/>
               <a:ext cx="91439" cy="0"/>
             </a:xfrm>
             <a:custGeom>
@@ -5541,7 +5541,7 @@
           </p:nvSpPr>
           <p:spPr>
             <a:xfrm>
-              <a:off x="1115568" y="2626768"/>
+              <a:off x="1115568" y="2602684"/>
               <a:ext cx="91439" cy="0"/>
             </a:xfrm>
             <a:custGeom>
@@ -5581,7 +5581,7 @@
           </p:nvSpPr>
           <p:spPr>
             <a:xfrm rot="-5400000">
-              <a:off x="847132" y="4268945"/>
+              <a:off x="847132" y="4060810"/>
               <a:ext cx="169515" cy="111323"/>
             </a:xfrm>
             <a:prstGeom prst="rect">
@@ -5627,7 +5627,7 @@
           </p:nvSpPr>
           <p:spPr>
             <a:xfrm rot="-5400000">
-              <a:off x="847132" y="3844486"/>
+              <a:off x="847132" y="3682363"/>
               <a:ext cx="169515" cy="111323"/>
             </a:xfrm>
             <a:prstGeom prst="rect">
@@ -5673,7 +5673,7 @@
           </p:nvSpPr>
           <p:spPr>
             <a:xfrm rot="-5400000">
-              <a:off x="804753" y="3420026"/>
+              <a:off x="804753" y="3303916"/>
               <a:ext cx="254272" cy="111323"/>
             </a:xfrm>
             <a:prstGeom prst="rect">
@@ -5719,53 +5719,7 @@
           </p:nvSpPr>
           <p:spPr>
             <a:xfrm rot="-5400000">
-              <a:off x="804753" y="2995566"/>
-              <a:ext cx="254272" cy="111323"/>
-            </a:xfrm>
-            <a:prstGeom prst="rect">
-              <a:avLst/>
-            </a:prstGeom>
-            <a:noFill/>
-          </p:spPr>
-          <p:txBody>
-            <a:bodyPr lIns="0" rIns="0" tIns="0" bIns="0" anchorCtr="1" anchor="ctr" wrap="none"/>
-            <a:lstStyle/>
-            <a:p>
-              <a:pPr algn="l" marL="0" marR="0" indent="0">
-                <a:lnSpc>
-                  <a:spcPts val="1200"/>
-                </a:lnSpc>
-                <a:spcBef>
-                  <a:spcPts val="0"/>
-                </a:spcBef>
-                <a:spcAft>
-                  <a:spcPts val="0"/>
-                </a:spcAft>
-              </a:pPr>
-              <a:r>
-                <a:rPr sz="1200">
-                  <a:solidFill>
-                    <a:srgbClr val="000000">
-                      <a:alpha val="100000"/>
-                    </a:srgbClr>
-                  </a:solidFill>
-                  <a:latin typeface="Arial"/>
-                  <a:cs typeface="Arial"/>
-                </a:rPr>
-                <a:t>101</a:t>
-              </a:r>
-            </a:p>
-          </p:txBody>
-        </p:sp>
-        <p:sp>
-          <p:nvSpPr>
-            <p:cNvPr id="125" name="tx125"/>
-            <p:cNvSpPr/>
-            <p:nvPr/>
-          </p:nvSpPr>
-          <p:spPr>
-            <a:xfrm rot="-5400000">
-              <a:off x="804753" y="2571106"/>
+              <a:off x="804753" y="2547022"/>
               <a:ext cx="254272" cy="111323"/>
             </a:xfrm>
             <a:prstGeom prst="rect">
@@ -5805,7 +5759,7 @@
         </p:sp>
         <p:sp>
           <p:nvSpPr>
-            <p:cNvPr id="126" name="pl126"/>
+            <p:cNvPr id="125" name="pl125"/>
             <p:cNvSpPr/>
             <p:nvPr/>
           </p:nvSpPr>
@@ -5854,7 +5808,7 @@
         </p:sp>
         <p:sp>
           <p:nvSpPr>
-            <p:cNvPr id="127" name="tx127"/>
+            <p:cNvPr id="126" name="tx126"/>
             <p:cNvSpPr/>
             <p:nvPr/>
           </p:nvSpPr>
@@ -5900,7 +5854,7 @@
         </p:sp>
         <p:sp>
           <p:nvSpPr>
-            <p:cNvPr id="128" name="tx128"/>
+            <p:cNvPr id="127" name="tx127"/>
             <p:cNvSpPr/>
             <p:nvPr/>
           </p:nvSpPr>
@@ -5946,7 +5900,7 @@
         </p:sp>
         <p:sp>
           <p:nvSpPr>
-            <p:cNvPr id="129" name="tx129"/>
+            <p:cNvPr id="128" name="tx128"/>
             <p:cNvSpPr/>
             <p:nvPr/>
           </p:nvSpPr>

</xml_diff>